<commit_message>
Corrections to repository and files added
MATLAB well written in all files. HIL exercise document translated into English
</commit_message>
<xml_diff>
--- a/2_PHASE3_Requirements/docs/2.2 Requirements management in MATLAB.pptx
+++ b/2_PHASE3_Requirements/docs/2.2 Requirements management in MATLAB.pptx
@@ -319,7 +319,7 @@
           <a:p>
             <a:fld id="{DE2F9ED7-D9DF-9B4A-A1AC-9FBF0C9B1C8E}" type="datetime1">
               <a:rPr lang="es-ES" smtClean="0"/>
-              <a:t>11/07/2023</a:t>
+              <a:t>14/09/2023</a:t>
             </a:fld>
             <a:endParaRPr lang="en-US"/>
           </a:p>
@@ -489,7 +489,7 @@
           <a:p>
             <a:fld id="{FEDC53B6-CB23-B545-A702-0812837A95EA}" type="datetime1">
               <a:rPr lang="es-ES" smtClean="0"/>
-              <a:t>11/07/2023</a:t>
+              <a:t>14/09/2023</a:t>
             </a:fld>
             <a:endParaRPr lang="en-US"/>
           </a:p>
@@ -1158,7 +1158,7 @@
           </a:lstStyle>
           <a:p>
             <a:r>
-              <a:rPr lang="en-GB"/>
+              <a:rPr lang="en-GB" dirty="0"/>
               <a:t>Testing and validation platforms - Requirements management in MATLAB</a:t>
             </a:r>
             <a:endParaRPr lang="en-US" dirty="0"/>
@@ -1472,7 +1472,7 @@
           </a:lstStyle>
           <a:p>
             <a:r>
-              <a:rPr lang="en-GB"/>
+              <a:rPr lang="en-GB" dirty="0"/>
               <a:t>Testing and validation platforms - Requirements management in MATLAB</a:t>
             </a:r>
             <a:endParaRPr lang="en-US" dirty="0"/>
@@ -1824,7 +1824,7 @@
           </a:lstStyle>
           <a:p>
             <a:r>
-              <a:rPr lang="en-GB"/>
+              <a:rPr lang="en-GB" dirty="0"/>
               <a:t>Testing and validation platforms - Requirements management in MATLAB</a:t>
             </a:r>
             <a:endParaRPr lang="en-US" dirty="0"/>
@@ -2152,7 +2152,7 @@
           </a:lstStyle>
           <a:p>
             <a:r>
-              <a:rPr lang="en-GB"/>
+              <a:rPr lang="en-GB" dirty="0"/>
               <a:t>Testing and validation platforms - Requirements management in MATLAB</a:t>
             </a:r>
             <a:endParaRPr lang="en-US" dirty="0"/>
@@ -2510,7 +2510,7 @@
           </a:lstStyle>
           <a:p>
             <a:r>
-              <a:rPr lang="en-GB"/>
+              <a:rPr lang="en-GB" dirty="0"/>
               <a:t>Testing and validation platforms - Requirements management in MATLAB</a:t>
             </a:r>
             <a:endParaRPr lang="en-US" dirty="0"/>
@@ -2875,7 +2875,7 @@
           </a:lstStyle>
           <a:p>
             <a:r>
-              <a:rPr lang="en-GB"/>
+              <a:rPr lang="en-GB" dirty="0"/>
               <a:t>Testing and validation platforms - Requirements management in MATLAB</a:t>
             </a:r>
             <a:endParaRPr lang="en-US" dirty="0"/>
@@ -3259,7 +3259,7 @@
           </a:lstStyle>
           <a:p>
             <a:r>
-              <a:rPr lang="en-GB"/>
+              <a:rPr lang="en-GB" dirty="0"/>
               <a:t>Testing and validation platforms - Requirements management in MATLAB</a:t>
             </a:r>
             <a:endParaRPr lang="en-US" dirty="0"/>
@@ -3642,7 +3642,7 @@
           </a:lstStyle>
           <a:p>
             <a:r>
-              <a:rPr lang="en-GB"/>
+              <a:rPr lang="en-GB" dirty="0"/>
               <a:t>Testing and validation platforms - Requirements management in MATLAB</a:t>
             </a:r>
             <a:endParaRPr lang="en-US" dirty="0"/>
@@ -4133,7 +4133,7 @@
           </a:lstStyle>
           <a:p>
             <a:r>
-              <a:rPr lang="en-GB"/>
+              <a:rPr lang="en-GB" dirty="0"/>
               <a:t>Testing and validation platforms - Requirements management in MATLAB</a:t>
             </a:r>
             <a:endParaRPr lang="en-US" dirty="0"/>
@@ -4608,7 +4608,7 @@
           </a:lstStyle>
           <a:p>
             <a:r>
-              <a:rPr lang="en-GB"/>
+              <a:rPr lang="en-GB" dirty="0"/>
               <a:t>Testing and validation platforms - Requirements management in MATLAB</a:t>
             </a:r>
             <a:endParaRPr lang="en-US" dirty="0"/>
@@ -5344,7 +5344,7 @@
           </a:lstStyle>
           <a:p>
             <a:r>
-              <a:rPr lang="en-GB"/>
+              <a:rPr lang="en-GB" dirty="0"/>
               <a:t>Testing and validation platforms - Requirements management in MATLAB</a:t>
             </a:r>
             <a:endParaRPr lang="en-US" dirty="0"/>
@@ -5659,7 +5659,7 @@
           </a:lstStyle>
           <a:p>
             <a:r>
-              <a:rPr lang="en-GB"/>
+              <a:rPr lang="en-GB" dirty="0"/>
               <a:t>Testing and validation platforms - Requirements management in MATLAB</a:t>
             </a:r>
             <a:endParaRPr lang="en-US" dirty="0"/>
@@ -5857,7 +5857,7 @@
           </a:lstStyle>
           <a:p>
             <a:r>
-              <a:rPr lang="en-GB"/>
+              <a:rPr lang="en-GB" dirty="0"/>
               <a:t>Testing and validation platforms - Requirements management in MATLAB</a:t>
             </a:r>
             <a:endParaRPr lang="en-US" dirty="0"/>
@@ -6055,7 +6055,7 @@
           </a:lstStyle>
           <a:p>
             <a:r>
-              <a:rPr lang="en-GB"/>
+              <a:rPr lang="en-GB" dirty="0"/>
               <a:t>Testing and validation platforms - Requirements management in MATLAB</a:t>
             </a:r>
             <a:endParaRPr lang="en-US" dirty="0"/>
@@ -9987,7 +9987,7 @@
           </a:lstStyle>
           <a:p>
             <a:r>
-              <a:rPr lang="en-GB"/>
+              <a:rPr lang="en-GB" dirty="0"/>
               <a:t>Testing and validation platforms - Requirements management in MATLAB</a:t>
             </a:r>
             <a:endParaRPr lang="en-US" dirty="0"/>
@@ -10865,7 +10865,7 @@
           <a:lstStyle/>
           <a:p>
             <a:r>
-              <a:rPr lang="en-GB"/>
+              <a:rPr lang="en-GB" dirty="0"/>
               <a:t>Testing and validation platforms - Requirements management in MATLAB</a:t>
             </a:r>
             <a:endParaRPr lang="en-US" dirty="0"/>
@@ -11627,7 +11627,7 @@
           <a:lstStyle/>
           <a:p>
             <a:r>
-              <a:rPr lang="en-GB"/>
+              <a:rPr lang="en-GB" dirty="0"/>
               <a:t>Testing and validation platforms - Requirements management in MATLAB</a:t>
             </a:r>
             <a:endParaRPr lang="en-US" dirty="0"/>
@@ -12241,7 +12241,7 @@
           <a:lstStyle/>
           <a:p>
             <a:r>
-              <a:rPr lang="en-GB"/>
+              <a:rPr lang="en-GB" dirty="0"/>
               <a:t>Testing and validation platforms - Requirements management in MATLAB</a:t>
             </a:r>
             <a:endParaRPr lang="en-US" dirty="0"/>
@@ -12866,7 +12866,7 @@
           <a:lstStyle/>
           <a:p>
             <a:r>
-              <a:rPr lang="en-GB"/>
+              <a:rPr lang="en-GB" dirty="0"/>
               <a:t>Testing and validation platforms - Requirements management in MATLAB</a:t>
             </a:r>
             <a:endParaRPr lang="en-US" dirty="0"/>
@@ -13213,7 +13213,7 @@
           <a:lstStyle/>
           <a:p>
             <a:r>
-              <a:rPr lang="en-GB"/>
+              <a:rPr lang="en-GB" dirty="0"/>
               <a:t>Testing and validation platforms - Requirements management in MATLAB</a:t>
             </a:r>
             <a:endParaRPr lang="en-US" dirty="0"/>
@@ -13634,7 +13634,7 @@
           <a:lstStyle/>
           <a:p>
             <a:r>
-              <a:rPr lang="en-GB"/>
+              <a:rPr lang="en-GB" dirty="0"/>
               <a:t>Testing and validation platforms - Requirements management in MATLAB</a:t>
             </a:r>
             <a:endParaRPr lang="en-US" dirty="0"/>
@@ -13977,7 +13977,7 @@
           <a:lstStyle/>
           <a:p>
             <a:r>
-              <a:rPr lang="en-GB"/>
+              <a:rPr lang="en-GB" dirty="0"/>
               <a:t>Testing and validation platforms - Requirements management in MATLAB</a:t>
             </a:r>
             <a:endParaRPr lang="en-US" dirty="0"/>
@@ -14564,7 +14564,7 @@
           <a:lstStyle/>
           <a:p>
             <a:r>
-              <a:rPr lang="en-GB"/>
+              <a:rPr lang="en-GB" dirty="0"/>
               <a:t>Testing and validation platforms - Requirements management in MATLAB</a:t>
             </a:r>
             <a:endParaRPr lang="en-US" dirty="0"/>
@@ -15115,7 +15115,7 @@
           <a:lstStyle/>
           <a:p>
             <a:r>
-              <a:rPr lang="en-GB"/>
+              <a:rPr lang="en-GB" dirty="0"/>
               <a:t>Testing and validation platforms - Requirements management in MATLAB</a:t>
             </a:r>
             <a:endParaRPr lang="en-US" dirty="0"/>
@@ -15344,7 +15344,7 @@
           <a:lstStyle/>
           <a:p>
             <a:r>
-              <a:rPr lang="en-GB"/>
+              <a:rPr lang="en-GB" dirty="0"/>
               <a:t>Testing and validation platforms - Requirements management in MATLAB</a:t>
             </a:r>
             <a:endParaRPr lang="en-US" dirty="0"/>
@@ -15834,7 +15834,7 @@
           <a:lstStyle/>
           <a:p>
             <a:r>
-              <a:rPr lang="en-GB"/>
+              <a:rPr lang="en-GB" dirty="0"/>
               <a:t>Testing and validation platforms - Requirements management in MATLAB</a:t>
             </a:r>
             <a:endParaRPr lang="en-US" dirty="0"/>
@@ -16078,7 +16078,7 @@
           <a:lstStyle/>
           <a:p>
             <a:r>
-              <a:rPr lang="en-GB"/>
+              <a:rPr lang="en-GB" dirty="0"/>
               <a:t>Testing and validation platforms - Requirements management in MATLAB</a:t>
             </a:r>
             <a:endParaRPr lang="en-US" dirty="0"/>
@@ -16507,7 +16507,7 @@
           <a:lstStyle/>
           <a:p>
             <a:r>
-              <a:rPr lang="en-GB"/>
+              <a:rPr lang="en-GB" dirty="0"/>
               <a:t>Testing and validation platforms - Requirements management in MATLAB</a:t>
             </a:r>
             <a:endParaRPr lang="en-US" dirty="0"/>
@@ -17084,7 +17084,7 @@
           <a:lstStyle/>
           <a:p>
             <a:r>
-              <a:rPr lang="en-GB"/>
+              <a:rPr lang="en-GB" dirty="0"/>
               <a:t>Testing and validation platforms - Requirements management in MATLAB</a:t>
             </a:r>
             <a:endParaRPr lang="en-US" dirty="0"/>
@@ -18232,7 +18232,7 @@
           <a:lstStyle/>
           <a:p>
             <a:r>
-              <a:rPr lang="en-GB"/>
+              <a:rPr lang="en-GB" dirty="0"/>
               <a:t>Testing and validation platforms - Requirements management in MATLAB</a:t>
             </a:r>
             <a:endParaRPr lang="en-US" dirty="0"/>
@@ -18813,7 +18813,7 @@
           <a:lstStyle/>
           <a:p>
             <a:r>
-              <a:rPr lang="en-GB"/>
+              <a:rPr lang="en-GB" dirty="0"/>
               <a:t>Testing and validation platforms - Requirements management in MATLAB</a:t>
             </a:r>
             <a:endParaRPr lang="en-US" dirty="0"/>
@@ -19236,7 +19236,7 @@
           <a:lstStyle/>
           <a:p>
             <a:r>
-              <a:rPr lang="en-GB"/>
+              <a:rPr lang="en-GB" dirty="0"/>
               <a:t>Testing and validation platforms - Requirements management in MATLAB</a:t>
             </a:r>
             <a:endParaRPr lang="en-US" dirty="0"/>
@@ -19648,7 +19648,7 @@
           <a:lstStyle/>
           <a:p>
             <a:r>
-              <a:rPr lang="en-GB"/>
+              <a:rPr lang="en-GB" dirty="0"/>
               <a:t>Testing and validation platforms - Requirements management in MATLAB</a:t>
             </a:r>
             <a:endParaRPr lang="en-US" dirty="0"/>
@@ -20150,7 +20150,7 @@
           <a:lstStyle/>
           <a:p>
             <a:r>
-              <a:rPr lang="en-GB"/>
+              <a:rPr lang="en-GB" dirty="0"/>
               <a:t>Testing and validation platforms - Requirements management in MATLAB</a:t>
             </a:r>
             <a:endParaRPr lang="en-US" dirty="0"/>
@@ -21148,7 +21148,7 @@
           <a:lstStyle/>
           <a:p>
             <a:r>
-              <a:rPr lang="en-GB"/>
+              <a:rPr lang="en-GB" dirty="0"/>
               <a:t>Testing and validation platforms - Requirements management in MATLAB</a:t>
             </a:r>
             <a:endParaRPr lang="en-US" dirty="0"/>
@@ -21823,7 +21823,7 @@
           <a:lstStyle/>
           <a:p>
             <a:r>
-              <a:rPr lang="en-GB"/>
+              <a:rPr lang="en-GB" dirty="0"/>
               <a:t>Testing and validation platforms - Requirements management in MATLAB</a:t>
             </a:r>
             <a:endParaRPr lang="en-US" dirty="0"/>
@@ -22413,7 +22413,7 @@
           <a:lstStyle/>
           <a:p>
             <a:r>
-              <a:rPr lang="en-GB"/>
+              <a:rPr lang="en-GB" dirty="0"/>
               <a:t>Testing and validation platforms - Requirements management in MATLAB</a:t>
             </a:r>
             <a:endParaRPr lang="en-US" dirty="0"/>
@@ -22979,7 +22979,7 @@
           <a:lstStyle/>
           <a:p>
             <a:r>
-              <a:rPr lang="en-GB"/>
+              <a:rPr lang="en-GB" dirty="0"/>
               <a:t>Testing and validation platforms - Requirements management in MATLAB</a:t>
             </a:r>
             <a:endParaRPr lang="en-US" dirty="0"/>
@@ -23540,7 +23540,7 @@
           <a:lstStyle/>
           <a:p>
             <a:r>
-              <a:rPr lang="en-GB"/>
+              <a:rPr lang="en-GB" dirty="0"/>
               <a:t>Testing and validation platforms - Requirements management in MATLAB</a:t>
             </a:r>
             <a:endParaRPr lang="en-US" dirty="0"/>
@@ -24612,7 +24612,7 @@
           <a:lstStyle/>
           <a:p>
             <a:r>
-              <a:rPr lang="en-GB"/>
+              <a:rPr lang="en-GB" dirty="0"/>
               <a:t>Testing and validation platforms - Requirements management in MATLAB</a:t>
             </a:r>
             <a:endParaRPr lang="en-US" dirty="0"/>
@@ -24885,7 +24885,7 @@
           <a:lstStyle/>
           <a:p>
             <a:r>
-              <a:rPr lang="en-GB"/>
+              <a:rPr lang="en-GB" dirty="0"/>
               <a:t>Testing and validation platforms - Requirements management in MATLAB</a:t>
             </a:r>
             <a:endParaRPr lang="en-US" dirty="0"/>
@@ -25305,7 +25305,7 @@
           <a:lstStyle/>
           <a:p>
             <a:r>
-              <a:rPr lang="en-GB"/>
+              <a:rPr lang="en-GB" dirty="0"/>
               <a:t>Testing and validation platforms - Requirements management in MATLAB</a:t>
             </a:r>
             <a:endParaRPr lang="en-US" dirty="0"/>
@@ -25729,7 +25729,7 @@
                 </a:solidFill>
                 <a:latin typeface="Roboto" panose="02000000000000000000" pitchFamily="2" charset="0"/>
               </a:rPr>
-              <a:t> in Matlab)</a:t>
+              <a:t> in MATLAB)</a:t>
             </a:r>
             <a:endParaRPr kumimoji="0" lang="es-ES" altLang="es-ES" sz="2400" b="0" i="0" u="none" strike="noStrike" cap="none" normalizeH="0" baseline="0" dirty="0">
               <a:ln>
@@ -25975,7 +25975,7 @@
           <a:lstStyle/>
           <a:p>
             <a:r>
-              <a:rPr lang="en-GB"/>
+              <a:rPr lang="en-GB" dirty="0"/>
               <a:t>Testing and validation platforms - Requirements management in MATLAB</a:t>
             </a:r>
             <a:endParaRPr lang="en-US" dirty="0"/>
@@ -26339,7 +26339,7 @@
           <a:lstStyle/>
           <a:p>
             <a:r>
-              <a:rPr lang="en-GB"/>
+              <a:rPr lang="en-GB" dirty="0"/>
               <a:t>Testing and validation platforms - Requirements management in MATLAB</a:t>
             </a:r>
             <a:endParaRPr lang="en-US" dirty="0"/>

</xml_diff>